<commit_message>
doing a new pull
new pull
</commit_message>
<xml_diff>
--- a/Unit 7/FLS/6371 FLS Unit 7.pptx
+++ b/Unit 7/FLS/6371 FLS Unit 7.pptx
@@ -5,7 +5,7 @@
     <p:sldMasterId id="2147483693" r:id="rId1"/>
   </p:sldMasterIdLst>
   <p:notesMasterIdLst>
-    <p:notesMasterId r:id="rId19"/>
+    <p:notesMasterId r:id="rId21"/>
   </p:notesMasterIdLst>
   <p:sldIdLst>
     <p:sldId id="270" r:id="rId2"/>
@@ -22,14 +22,16 @@
     <p:sldId id="421" r:id="rId13"/>
     <p:sldId id="509" r:id="rId14"/>
     <p:sldId id="508" r:id="rId15"/>
-    <p:sldId id="334" r:id="rId16"/>
-    <p:sldId id="336" r:id="rId17"/>
-    <p:sldId id="413" r:id="rId18"/>
+    <p:sldId id="510" r:id="rId16"/>
+    <p:sldId id="511" r:id="rId17"/>
+    <p:sldId id="334" r:id="rId18"/>
+    <p:sldId id="336" r:id="rId19"/>
+    <p:sldId id="413" r:id="rId20"/>
   </p:sldIdLst>
   <p:sldSz cx="12192000" cy="6858000"/>
   <p:notesSz cx="6858000" cy="9144000"/>
   <p:custDataLst>
-    <p:tags r:id="rId20"/>
+    <p:tags r:id="rId22"/>
   </p:custDataLst>
   <p:defaultTextStyle>
     <a:defPPr>
@@ -239,7 +241,7 @@
           <a:p>
             <a:fld id="{28570D6A-FB49-A14C-9B03-21B3417100CD}" type="datetimeFigureOut">
               <a:rPr lang="en-US" smtClean="0"/>
-              <a:t>10/1/21</a:t>
+              <a:t>10/5/2023</a:t>
             </a:fld>
             <a:endParaRPr lang="en-US" dirty="0"/>
           </a:p>
@@ -2725,8 +2727,8 @@
           <a:chExt cx="0" cy="0"/>
         </a:xfrm>
       </p:grpSpPr>
-      <mc:AlternateContent xmlns:mc="http://schemas.openxmlformats.org/markup-compatibility/2006">
-        <mc:Choice xmlns:a14="http://schemas.microsoft.com/office/drawing/2010/main" Requires="a14">
+      <mc:AlternateContent xmlns:mc="http://schemas.openxmlformats.org/markup-compatibility/2006" xmlns:a14="http://schemas.microsoft.com/office/drawing/2010/main">
+        <mc:Choice Requires="a14">
           <p:sp>
             <p:nvSpPr>
               <p:cNvPr id="2" name="Title 1">
@@ -2793,7 +2795,7 @@
             </p:txBody>
           </p:sp>
         </mc:Choice>
-        <mc:Fallback>
+        <mc:Fallback xmlns="">
           <p:sp>
             <p:nvSpPr>
               <p:cNvPr id="2" name="Title 1">
@@ -2960,8 +2962,8 @@
           <a:chExt cx="0" cy="0"/>
         </a:xfrm>
       </p:grpSpPr>
-      <mc:AlternateContent xmlns:mc="http://schemas.openxmlformats.org/markup-compatibility/2006">
-        <mc:Choice xmlns:a14="http://schemas.microsoft.com/office/drawing/2010/main" Requires="a14">
+      <mc:AlternateContent xmlns:mc="http://schemas.openxmlformats.org/markup-compatibility/2006" xmlns:a14="http://schemas.microsoft.com/office/drawing/2010/main">
+        <mc:Choice Requires="a14">
           <p:sp>
             <p:nvSpPr>
               <p:cNvPr id="2" name="Title 1">
@@ -3021,7 +3023,7 @@
             </p:txBody>
           </p:sp>
         </mc:Choice>
-        <mc:Fallback>
+        <mc:Fallback xmlns="">
           <p:sp>
             <p:nvSpPr>
               <p:cNvPr id="2" name="Title 1">
@@ -3188,7 +3190,7 @@
           <p:cNvPr id="2" name="Title 1">
             <a:extLst>
               <a:ext uri="{FF2B5EF4-FFF2-40B4-BE49-F238E27FC236}">
-                <a16:creationId xmlns:a16="http://schemas.microsoft.com/office/drawing/2014/main" id="{78576CAF-641E-A545-AB1E-A0BE7A1FF036}"/>
+                <a16:creationId xmlns:a16="http://schemas.microsoft.com/office/drawing/2014/main" id="{636D746A-C313-F361-5D81-C63CE0420ED3}"/>
               </a:ext>
             </a:extLst>
           </p:cNvPr>
@@ -3204,10 +3206,9 @@
           <a:bodyPr/>
           <a:lstStyle/>
           <a:p>
-            <a:pPr algn="l"/>
-            <a:r>
-              <a:rPr lang="en-US" dirty="0"/>
-              <a:t>Question 4: Takeaways!</a:t>
+            <a:r>
+              <a:rPr lang="en-US" dirty="0"/>
+              <a:t>Handicap</a:t>
             </a:r>
           </a:p>
         </p:txBody>
@@ -3217,7 +3218,7 @@
           <p:cNvPr id="3" name="Content Placeholder 2">
             <a:extLst>
               <a:ext uri="{FF2B5EF4-FFF2-40B4-BE49-F238E27FC236}">
-                <a16:creationId xmlns:a16="http://schemas.microsoft.com/office/drawing/2014/main" id="{1E3CA146-5F00-F544-97FC-4BDA5AA35C64}"/>
+                <a16:creationId xmlns:a16="http://schemas.microsoft.com/office/drawing/2014/main" id="{DA741182-851A-9D3B-2452-027B0338811E}"/>
               </a:ext>
             </a:extLst>
           </p:cNvPr>
@@ -3228,64 +3229,19 @@
             <p:ph idx="1"/>
           </p:nvPr>
         </p:nvSpPr>
-        <p:spPr>
-          <a:xfrm>
-            <a:off x="533400" y="1825625"/>
-            <a:ext cx="9657945" cy="4351338"/>
-          </a:xfrm>
-        </p:spPr>
-        <p:txBody>
-          <a:bodyPr>
-            <a:normAutofit fontScale="92500" lnSpcReduction="10000"/>
-          </a:bodyPr>
+        <p:spPr/>
+        <p:txBody>
+          <a:bodyPr/>
           <a:lstStyle/>
           <a:p>
-            <a:pPr marL="0" indent="0">
-              <a:buNone/>
-            </a:pPr>
-            <a:r>
-              <a:rPr lang="en-US" dirty="0"/>
-              <a:t>Please provide at least 4 takeaways from this section and any questions that you may have.  These questions will help design the live session for this unit.</a:t>
-            </a:r>
-          </a:p>
-          <a:p>
-            <a:pPr marL="0" indent="0">
-              <a:buNone/>
-            </a:pPr>
-            <a:r>
-              <a:rPr lang="en-US" dirty="0"/>
-              <a:t> </a:t>
-            </a:r>
-          </a:p>
-          <a:p>
-            <a:pPr marL="0" indent="0">
-              <a:buNone/>
-            </a:pPr>
-            <a:r>
-              <a:rPr lang="en-US" sz="2000" i="1" dirty="0"/>
-              <a:t>This question will be the last question of every For Live Session Assignment. The idea is that this deck will serve as a document that you can reference in the future to remember what was covered in this section.  For instance, this may come in handy for the Capstone and will hopefully become useful in your career.  Most immediately, it may become handy as a quick reference for your Midterm and Final!  Some students find it very useful and spend a few slides summarizing the </a:t>
-            </a:r>
-            <a:r>
-              <a:rPr lang="en-US" sz="2000" i="1" dirty="0" err="1"/>
-              <a:t>asynch</a:t>
-            </a:r>
-            <a:r>
-              <a:rPr lang="en-US" sz="2000" i="1" dirty="0"/>
-              <a:t> material while others learn different ways and only had the minimum 4 takeaways.  Either is fine and will earn you full credit for this question.  </a:t>
-            </a:r>
-          </a:p>
-          <a:p>
-            <a:pPr marL="0" indent="0">
-              <a:buNone/>
-            </a:pPr>
-            <a:endParaRPr lang="en-US" dirty="0"/>
+            <a:endParaRPr lang="en-US"/>
           </a:p>
         </p:txBody>
       </p:sp>
     </p:spTree>
     <p:extLst>
       <p:ext uri="{BB962C8B-B14F-4D97-AF65-F5344CB8AC3E}">
-        <p14:creationId xmlns:p14="http://schemas.microsoft.com/office/powerpoint/2010/main" val="2751418390"/>
+        <p14:creationId xmlns:p14="http://schemas.microsoft.com/office/powerpoint/2010/main" val="456034707"/>
       </p:ext>
     </p:extLst>
   </p:cSld>
@@ -3317,6 +3273,89 @@
           <p:cNvPr id="2" name="Title 1">
             <a:extLst>
               <a:ext uri="{FF2B5EF4-FFF2-40B4-BE49-F238E27FC236}">
+                <a16:creationId xmlns:a16="http://schemas.microsoft.com/office/drawing/2014/main" id="{0E413C51-6E39-55BF-3A62-43B2C97B4170}"/>
+              </a:ext>
+            </a:extLst>
+          </p:cNvPr>
+          <p:cNvSpPr>
+            <a:spLocks noGrp="1"/>
+          </p:cNvSpPr>
+          <p:nvPr>
+            <p:ph type="title"/>
+          </p:nvPr>
+        </p:nvSpPr>
+        <p:spPr/>
+        <p:txBody>
+          <a:bodyPr/>
+          <a:lstStyle/>
+          <a:p>
+            <a:r>
+              <a:rPr lang="en-US" dirty="0"/>
+              <a:t>Handicap</a:t>
+            </a:r>
+          </a:p>
+        </p:txBody>
+      </p:sp>
+      <p:sp>
+        <p:nvSpPr>
+          <p:cNvPr id="3" name="Content Placeholder 2">
+            <a:extLst>
+              <a:ext uri="{FF2B5EF4-FFF2-40B4-BE49-F238E27FC236}">
+                <a16:creationId xmlns:a16="http://schemas.microsoft.com/office/drawing/2014/main" id="{496F24DE-2A34-8D89-B977-90D8E72F74BB}"/>
+              </a:ext>
+            </a:extLst>
+          </p:cNvPr>
+          <p:cNvSpPr>
+            <a:spLocks noGrp="1"/>
+          </p:cNvSpPr>
+          <p:nvPr>
+            <p:ph idx="1"/>
+          </p:nvPr>
+        </p:nvSpPr>
+        <p:spPr/>
+        <p:txBody>
+          <a:bodyPr/>
+          <a:lstStyle/>
+          <a:p>
+            <a:endParaRPr lang="en-US" dirty="0"/>
+          </a:p>
+        </p:txBody>
+      </p:sp>
+    </p:spTree>
+    <p:extLst>
+      <p:ext uri="{BB962C8B-B14F-4D97-AF65-F5344CB8AC3E}">
+        <p14:creationId xmlns:p14="http://schemas.microsoft.com/office/powerpoint/2010/main" val="4017673876"/>
+      </p:ext>
+    </p:extLst>
+  </p:cSld>
+  <p:clrMapOvr>
+    <a:masterClrMapping/>
+  </p:clrMapOvr>
+</p:sld>
+</file>
+
+<file path=ppt/slides/slide17.xml><?xml version="1.0" encoding="utf-8"?>
+<p:sld xmlns:a="http://schemas.openxmlformats.org/drawingml/2006/main" xmlns:r="http://schemas.openxmlformats.org/officeDocument/2006/relationships" xmlns:p="http://schemas.openxmlformats.org/presentationml/2006/main">
+  <p:cSld>
+    <p:spTree>
+      <p:nvGrpSpPr>
+        <p:cNvPr id="1" name=""/>
+        <p:cNvGrpSpPr/>
+        <p:nvPr/>
+      </p:nvGrpSpPr>
+      <p:grpSpPr>
+        <a:xfrm>
+          <a:off x="0" y="0"/>
+          <a:ext cx="0" cy="0"/>
+          <a:chOff x="0" y="0"/>
+          <a:chExt cx="0" cy="0"/>
+        </a:xfrm>
+      </p:grpSpPr>
+      <p:sp>
+        <p:nvSpPr>
+          <p:cNvPr id="2" name="Title 1">
+            <a:extLst>
+              <a:ext uri="{FF2B5EF4-FFF2-40B4-BE49-F238E27FC236}">
                 <a16:creationId xmlns:a16="http://schemas.microsoft.com/office/drawing/2014/main" id="{78576CAF-641E-A545-AB1E-A0BE7A1FF036}"/>
               </a:ext>
             </a:extLst>
@@ -3336,7 +3375,7 @@
             <a:pPr algn="l"/>
             <a:r>
               <a:rPr lang="en-US" dirty="0"/>
-              <a:t>Question 5: Questions!</a:t>
+              <a:t>Question 4: Takeaways!</a:t>
             </a:r>
           </a:p>
         </p:txBody>
@@ -3359,6 +3398,130 @@
         </p:nvSpPr>
         <p:spPr>
           <a:xfrm>
+            <a:off x="533400" y="1825625"/>
+            <a:ext cx="9657945" cy="4351338"/>
+          </a:xfrm>
+        </p:spPr>
+        <p:txBody>
+          <a:bodyPr>
+            <a:normAutofit/>
+          </a:bodyPr>
+          <a:lstStyle/>
+          <a:p>
+            <a:pPr marL="0" indent="0">
+              <a:buNone/>
+            </a:pPr>
+            <a:r>
+              <a:rPr lang="en-US" dirty="0"/>
+              <a:t>Please provide at least 4 takeaways from this section and any questions that you may have.  These questions will help design the live session for this unit.</a:t>
+            </a:r>
+          </a:p>
+          <a:p>
+            <a:pPr marL="0" indent="0">
+              <a:buNone/>
+            </a:pPr>
+            <a:r>
+              <a:rPr lang="en-US" dirty="0"/>
+              <a:t> </a:t>
+            </a:r>
+          </a:p>
+          <a:p>
+            <a:pPr marL="0" indent="0">
+              <a:buNone/>
+            </a:pPr>
+            <a:r>
+              <a:rPr lang="en-US" dirty="0"/>
+              <a:t>- Was the point of this exercise to do the Tukey’s test for the heights?</a:t>
+            </a:r>
+          </a:p>
+          <a:p>
+            <a:pPr marL="0" indent="0">
+              <a:buNone/>
+            </a:pPr>
+            <a:r>
+              <a:rPr lang="en-US" dirty="0"/>
+              <a:t>.  </a:t>
+            </a:r>
+          </a:p>
+        </p:txBody>
+      </p:sp>
+    </p:spTree>
+    <p:extLst>
+      <p:ext uri="{BB962C8B-B14F-4D97-AF65-F5344CB8AC3E}">
+        <p14:creationId xmlns:p14="http://schemas.microsoft.com/office/powerpoint/2010/main" val="2751418390"/>
+      </p:ext>
+    </p:extLst>
+  </p:cSld>
+  <p:clrMapOvr>
+    <a:masterClrMapping/>
+  </p:clrMapOvr>
+</p:sld>
+</file>
+
+<file path=ppt/slides/slide18.xml><?xml version="1.0" encoding="utf-8"?>
+<p:sld xmlns:a="http://schemas.openxmlformats.org/drawingml/2006/main" xmlns:r="http://schemas.openxmlformats.org/officeDocument/2006/relationships" xmlns:p="http://schemas.openxmlformats.org/presentationml/2006/main">
+  <p:cSld>
+    <p:spTree>
+      <p:nvGrpSpPr>
+        <p:cNvPr id="1" name=""/>
+        <p:cNvGrpSpPr/>
+        <p:nvPr/>
+      </p:nvGrpSpPr>
+      <p:grpSpPr>
+        <a:xfrm>
+          <a:off x="0" y="0"/>
+          <a:ext cx="0" cy="0"/>
+          <a:chOff x="0" y="0"/>
+          <a:chExt cx="0" cy="0"/>
+        </a:xfrm>
+      </p:grpSpPr>
+      <p:sp>
+        <p:nvSpPr>
+          <p:cNvPr id="2" name="Title 1">
+            <a:extLst>
+              <a:ext uri="{FF2B5EF4-FFF2-40B4-BE49-F238E27FC236}">
+                <a16:creationId xmlns:a16="http://schemas.microsoft.com/office/drawing/2014/main" id="{78576CAF-641E-A545-AB1E-A0BE7A1FF036}"/>
+              </a:ext>
+            </a:extLst>
+          </p:cNvPr>
+          <p:cNvSpPr>
+            <a:spLocks noGrp="1"/>
+          </p:cNvSpPr>
+          <p:nvPr>
+            <p:ph type="title"/>
+          </p:nvPr>
+        </p:nvSpPr>
+        <p:spPr/>
+        <p:txBody>
+          <a:bodyPr/>
+          <a:lstStyle/>
+          <a:p>
+            <a:pPr algn="l"/>
+            <a:r>
+              <a:rPr lang="en-US" dirty="0"/>
+              <a:t>Question 5: Questions!</a:t>
+            </a:r>
+          </a:p>
+        </p:txBody>
+      </p:sp>
+      <p:sp>
+        <p:nvSpPr>
+          <p:cNvPr id="3" name="Content Placeholder 2">
+            <a:extLst>
+              <a:ext uri="{FF2B5EF4-FFF2-40B4-BE49-F238E27FC236}">
+                <a16:creationId xmlns:a16="http://schemas.microsoft.com/office/drawing/2014/main" id="{1E3CA146-5F00-F544-97FC-4BDA5AA35C64}"/>
+              </a:ext>
+            </a:extLst>
+          </p:cNvPr>
+          <p:cNvSpPr>
+            <a:spLocks noGrp="1"/>
+          </p:cNvSpPr>
+          <p:nvPr>
+            <p:ph idx="1"/>
+          </p:nvPr>
+        </p:nvSpPr>
+        <p:spPr>
+          <a:xfrm>
             <a:off x="609600" y="1905000"/>
             <a:ext cx="10820400" cy="4351338"/>
           </a:xfrm>
@@ -3424,7 +3587,7 @@
 </p:sld>
 </file>
 
-<file path=ppt/slides/slide17.xml><?xml version="1.0" encoding="utf-8"?>
+<file path=ppt/slides/slide19.xml><?xml version="1.0" encoding="utf-8"?>
 <p:sld xmlns:a="http://schemas.openxmlformats.org/drawingml/2006/main" xmlns:r="http://schemas.openxmlformats.org/officeDocument/2006/relationships" xmlns:p="http://schemas.openxmlformats.org/presentationml/2006/main">
   <p:cSld>
     <p:spTree>
@@ -3606,7 +3769,7 @@
               <a:pPr>
                 <a:defRPr/>
               </a:pPr>
-              <a:t>17</a:t>
+              <a:t>19</a:t>
             </a:fld>
             <a:endParaRPr lang="en-US" altLang="en-US" dirty="0"/>
           </a:p>
@@ -3764,6 +3927,98 @@
           </a:prstGeom>
         </p:spPr>
       </p:pic>
+      <p:sp>
+        <p:nvSpPr>
+          <p:cNvPr id="3" name="Rectangle 2">
+            <a:extLst>
+              <a:ext uri="{FF2B5EF4-FFF2-40B4-BE49-F238E27FC236}">
+                <a16:creationId xmlns:a16="http://schemas.microsoft.com/office/drawing/2014/main" id="{E3213ADC-DDE2-89E1-A3BD-DDC48F08AEA1}"/>
+              </a:ext>
+            </a:extLst>
+          </p:cNvPr>
+          <p:cNvSpPr/>
+          <p:nvPr/>
+        </p:nvSpPr>
+        <p:spPr>
+          <a:xfrm>
+            <a:off x="2286000" y="3124200"/>
+            <a:ext cx="3733800" cy="381000"/>
+          </a:xfrm>
+          <a:prstGeom prst="rect">
+            <a:avLst/>
+          </a:prstGeom>
+        </p:spPr>
+        <p:style>
+          <a:lnRef idx="2">
+            <a:schemeClr val="accent1">
+              <a:shade val="15000"/>
+            </a:schemeClr>
+          </a:lnRef>
+          <a:fillRef idx="1">
+            <a:schemeClr val="accent1"/>
+          </a:fillRef>
+          <a:effectRef idx="0">
+            <a:schemeClr val="accent1"/>
+          </a:effectRef>
+          <a:fontRef idx="minor">
+            <a:schemeClr val="lt1"/>
+          </a:fontRef>
+        </p:style>
+        <p:txBody>
+          <a:bodyPr rtlCol="0" anchor="ctr"/>
+          <a:lstStyle/>
+          <a:p>
+            <a:pPr algn="ctr"/>
+            <a:endParaRPr lang="en-US"/>
+          </a:p>
+        </p:txBody>
+      </p:sp>
+      <p:sp>
+        <p:nvSpPr>
+          <p:cNvPr id="5" name="Rectangle 4">
+            <a:extLst>
+              <a:ext uri="{FF2B5EF4-FFF2-40B4-BE49-F238E27FC236}">
+                <a16:creationId xmlns:a16="http://schemas.microsoft.com/office/drawing/2014/main" id="{11941DE2-AC93-2187-E7D9-FE1AB81A92CA}"/>
+              </a:ext>
+            </a:extLst>
+          </p:cNvPr>
+          <p:cNvSpPr/>
+          <p:nvPr/>
+        </p:nvSpPr>
+        <p:spPr>
+          <a:xfrm>
+            <a:off x="2286000" y="4191000"/>
+            <a:ext cx="7772400" cy="838200"/>
+          </a:xfrm>
+          <a:prstGeom prst="rect">
+            <a:avLst/>
+          </a:prstGeom>
+        </p:spPr>
+        <p:style>
+          <a:lnRef idx="2">
+            <a:schemeClr val="accent1">
+              <a:shade val="15000"/>
+            </a:schemeClr>
+          </a:lnRef>
+          <a:fillRef idx="1">
+            <a:schemeClr val="accent1"/>
+          </a:fillRef>
+          <a:effectRef idx="0">
+            <a:schemeClr val="accent1"/>
+          </a:effectRef>
+          <a:fontRef idx="minor">
+            <a:schemeClr val="lt1"/>
+          </a:fontRef>
+        </p:style>
+        <p:txBody>
+          <a:bodyPr rtlCol="0" anchor="ctr"/>
+          <a:lstStyle/>
+          <a:p>
+            <a:pPr algn="ctr"/>
+            <a:endParaRPr lang="en-US"/>
+          </a:p>
+        </p:txBody>
+      </p:sp>
     </p:spTree>
     <p:extLst>
       <p:ext uri="{BB962C8B-B14F-4D97-AF65-F5344CB8AC3E}">
@@ -3852,6 +4107,52 @@
           </a:prstGeom>
         </p:spPr>
       </p:pic>
+      <p:sp>
+        <p:nvSpPr>
+          <p:cNvPr id="4" name="Rectangle 3">
+            <a:extLst>
+              <a:ext uri="{FF2B5EF4-FFF2-40B4-BE49-F238E27FC236}">
+                <a16:creationId xmlns:a16="http://schemas.microsoft.com/office/drawing/2014/main" id="{15F24471-DE4B-0380-D413-A681C89CDD6A}"/>
+              </a:ext>
+            </a:extLst>
+          </p:cNvPr>
+          <p:cNvSpPr/>
+          <p:nvPr/>
+        </p:nvSpPr>
+        <p:spPr>
+          <a:xfrm>
+            <a:off x="3200400" y="3352800"/>
+            <a:ext cx="3352800" cy="1752600"/>
+          </a:xfrm>
+          <a:prstGeom prst="rect">
+            <a:avLst/>
+          </a:prstGeom>
+        </p:spPr>
+        <p:style>
+          <a:lnRef idx="2">
+            <a:schemeClr val="accent1">
+              <a:shade val="15000"/>
+            </a:schemeClr>
+          </a:lnRef>
+          <a:fillRef idx="1">
+            <a:schemeClr val="accent1"/>
+          </a:fillRef>
+          <a:effectRef idx="0">
+            <a:schemeClr val="accent1"/>
+          </a:effectRef>
+          <a:fontRef idx="minor">
+            <a:schemeClr val="lt1"/>
+          </a:fontRef>
+        </p:style>
+        <p:txBody>
+          <a:bodyPr rtlCol="0" anchor="ctr"/>
+          <a:lstStyle/>
+          <a:p>
+            <a:pPr algn="ctr"/>
+            <a:endParaRPr lang="en-US"/>
+          </a:p>
+        </p:txBody>
+      </p:sp>
     </p:spTree>
     <p:extLst>
       <p:ext uri="{BB962C8B-B14F-4D97-AF65-F5344CB8AC3E}">
@@ -3940,6 +4241,98 @@
           </a:prstGeom>
         </p:spPr>
       </p:pic>
+      <p:sp>
+        <p:nvSpPr>
+          <p:cNvPr id="3" name="Rectangle 2">
+            <a:extLst>
+              <a:ext uri="{FF2B5EF4-FFF2-40B4-BE49-F238E27FC236}">
+                <a16:creationId xmlns:a16="http://schemas.microsoft.com/office/drawing/2014/main" id="{C30CABAF-19FC-DF01-4BB9-1D8A9FD9A7E9}"/>
+              </a:ext>
+            </a:extLst>
+          </p:cNvPr>
+          <p:cNvSpPr/>
+          <p:nvPr/>
+        </p:nvSpPr>
+        <p:spPr>
+          <a:xfrm>
+            <a:off x="2286000" y="3429000"/>
+            <a:ext cx="2667000" cy="838200"/>
+          </a:xfrm>
+          <a:prstGeom prst="rect">
+            <a:avLst/>
+          </a:prstGeom>
+        </p:spPr>
+        <p:style>
+          <a:lnRef idx="2">
+            <a:schemeClr val="accent1">
+              <a:shade val="15000"/>
+            </a:schemeClr>
+          </a:lnRef>
+          <a:fillRef idx="1">
+            <a:schemeClr val="accent1"/>
+          </a:fillRef>
+          <a:effectRef idx="0">
+            <a:schemeClr val="accent1"/>
+          </a:effectRef>
+          <a:fontRef idx="minor">
+            <a:schemeClr val="lt1"/>
+          </a:fontRef>
+        </p:style>
+        <p:txBody>
+          <a:bodyPr rtlCol="0" anchor="ctr"/>
+          <a:lstStyle/>
+          <a:p>
+            <a:pPr algn="ctr"/>
+            <a:endParaRPr lang="en-US"/>
+          </a:p>
+        </p:txBody>
+      </p:sp>
+      <p:sp>
+        <p:nvSpPr>
+          <p:cNvPr id="5" name="Rectangle 4">
+            <a:extLst>
+              <a:ext uri="{FF2B5EF4-FFF2-40B4-BE49-F238E27FC236}">
+                <a16:creationId xmlns:a16="http://schemas.microsoft.com/office/drawing/2014/main" id="{D14CD0FF-D0DA-C84B-40E3-FFA68283B216}"/>
+              </a:ext>
+            </a:extLst>
+          </p:cNvPr>
+          <p:cNvSpPr/>
+          <p:nvPr/>
+        </p:nvSpPr>
+        <p:spPr>
+          <a:xfrm>
+            <a:off x="2209800" y="4648200"/>
+            <a:ext cx="3048000" cy="457200"/>
+          </a:xfrm>
+          <a:prstGeom prst="rect">
+            <a:avLst/>
+          </a:prstGeom>
+        </p:spPr>
+        <p:style>
+          <a:lnRef idx="2">
+            <a:schemeClr val="accent1">
+              <a:shade val="15000"/>
+            </a:schemeClr>
+          </a:lnRef>
+          <a:fillRef idx="1">
+            <a:schemeClr val="accent1"/>
+          </a:fillRef>
+          <a:effectRef idx="0">
+            <a:schemeClr val="accent1"/>
+          </a:effectRef>
+          <a:fontRef idx="minor">
+            <a:schemeClr val="lt1"/>
+          </a:fontRef>
+        </p:style>
+        <p:txBody>
+          <a:bodyPr rtlCol="0" anchor="ctr"/>
+          <a:lstStyle/>
+          <a:p>
+            <a:pPr algn="ctr"/>
+            <a:endParaRPr lang="en-US"/>
+          </a:p>
+        </p:txBody>
+      </p:sp>
     </p:spTree>
     <p:extLst>
       <p:ext uri="{BB962C8B-B14F-4D97-AF65-F5344CB8AC3E}">
@@ -4028,6 +4421,52 @@
           </a:prstGeom>
         </p:spPr>
       </p:pic>
+      <p:sp>
+        <p:nvSpPr>
+          <p:cNvPr id="3" name="Rectangle 2">
+            <a:extLst>
+              <a:ext uri="{FF2B5EF4-FFF2-40B4-BE49-F238E27FC236}">
+                <a16:creationId xmlns:a16="http://schemas.microsoft.com/office/drawing/2014/main" id="{38F94973-9E63-8FA6-92C8-7F42FD72ADF0}"/>
+              </a:ext>
+            </a:extLst>
+          </p:cNvPr>
+          <p:cNvSpPr/>
+          <p:nvPr/>
+        </p:nvSpPr>
+        <p:spPr>
+          <a:xfrm>
+            <a:off x="1981200" y="3657600"/>
+            <a:ext cx="7772400" cy="1724497"/>
+          </a:xfrm>
+          <a:prstGeom prst="rect">
+            <a:avLst/>
+          </a:prstGeom>
+        </p:spPr>
+        <p:style>
+          <a:lnRef idx="2">
+            <a:schemeClr val="accent1">
+              <a:shade val="15000"/>
+            </a:schemeClr>
+          </a:lnRef>
+          <a:fillRef idx="1">
+            <a:schemeClr val="accent1"/>
+          </a:fillRef>
+          <a:effectRef idx="0">
+            <a:schemeClr val="accent1"/>
+          </a:effectRef>
+          <a:fontRef idx="minor">
+            <a:schemeClr val="lt1"/>
+          </a:fontRef>
+        </p:style>
+        <p:txBody>
+          <a:bodyPr rtlCol="0" anchor="ctr"/>
+          <a:lstStyle/>
+          <a:p>
+            <a:pPr algn="ctr"/>
+            <a:endParaRPr lang="en-US"/>
+          </a:p>
+        </p:txBody>
+      </p:sp>
     </p:spTree>
     <p:extLst>
       <p:ext uri="{BB962C8B-B14F-4D97-AF65-F5344CB8AC3E}">
@@ -4198,8 +4637,8 @@
           <a:chExt cx="0" cy="0"/>
         </a:xfrm>
       </p:grpSpPr>
-      <mc:AlternateContent xmlns:mc="http://schemas.openxmlformats.org/markup-compatibility/2006">
-        <mc:Choice xmlns:a14="http://schemas.microsoft.com/office/drawing/2010/main" Requires="a14">
+      <mc:AlternateContent xmlns:mc="http://schemas.openxmlformats.org/markup-compatibility/2006" xmlns:a14="http://schemas.microsoft.com/office/drawing/2010/main">
+        <mc:Choice Requires="a14">
           <p:sp>
             <p:nvSpPr>
               <p:cNvPr id="2" name="Title 1">
@@ -4266,7 +4705,7 @@
             </p:txBody>
           </p:sp>
         </mc:Choice>
-        <mc:Fallback>
+        <mc:Fallback xmlns="">
           <p:sp>
             <p:nvSpPr>
               <p:cNvPr id="2" name="Title 1">

</xml_diff>